<commit_message>
Updated Powerpoint Password + Info_Paswoord
</commit_message>
<xml_diff>
--- a/Documentation/Project Onderzoek.pptx
+++ b/Documentation/Project Onderzoek.pptx
@@ -6564,15 +6564,14 @@
           </a:p>
           <a:p>
             <a:r>
+              <a:rPr lang="nl-BE" dirty="0"/>
+              <a:t>C/C++</a:t>
+            </a:r>
+          </a:p>
+          <a:p>
+            <a:r>
               <a:rPr lang="nl-BE" dirty="0" err="1"/>
-              <a:t>MicroPython</a:t>
-            </a:r>
-            <a:endParaRPr lang="nl-BE" dirty="0"/>
-          </a:p>
-          <a:p>
-            <a:r>
-              <a:rPr lang="nl-BE" dirty="0" err="1"/>
-              <a:t>Thonny</a:t>
+              <a:t>Arduino</a:t>
             </a:r>
             <a:r>
               <a:rPr lang="nl-BE" dirty="0"/>
@@ -6580,6 +6579,9 @@
             </a:r>
           </a:p>
           <a:p>
+            <a:pPr marL="0" indent="0">
+              <a:buNone/>
+            </a:pPr>
             <a:endParaRPr lang="nl-BE" dirty="0"/>
           </a:p>
           <a:p>
@@ -6606,21 +6608,6 @@
               <a:rPr lang="nl-BE" dirty="0" err="1"/>
               <a:t>Buttons,Leds</a:t>
             </a:r>
-            <a:br>
-              <a:rPr lang="nl-BE" dirty="0"/>
-            </a:br>
-            <a:r>
-              <a:rPr lang="nl-BE" dirty="0"/>
-              <a:t>               </a:t>
-            </a:r>
-          </a:p>
-          <a:p>
-            <a:endParaRPr lang="nl-BE" dirty="0"/>
-          </a:p>
-          <a:p>
-            <a:pPr marL="0" indent="0">
-              <a:buNone/>
-            </a:pPr>
             <a:endParaRPr lang="nl-BE" dirty="0"/>
           </a:p>
         </p:txBody>

</xml_diff>